<commit_message>
modified leaflet for grizzly
</commit_message>
<xml_diff>
--- a/OpenStack-leaflet-grizzly.pptx
+++ b/OpenStack-leaflet-grizzly.pptx
@@ -288,7 +288,8 @@
           <a:p>
             <a:fld id="{B7AD0B82-7909-4859-B207-4CBCE1B1F787}" type="datetimeFigureOut">
               <a:rPr kumimoji="1" lang="ja-JP" altLang="en-US" smtClean="0"/>
-              <a:t>2013/5/23</a:t>
+              <a:pPr/>
+              <a:t>2013/6/19</a:t>
             </a:fld>
             <a:endParaRPr kumimoji="1" lang="ja-JP" altLang="en-US"/>
           </a:p>
@@ -330,6 +331,7 @@
           <a:p>
             <a:fld id="{925F48D1-CF89-4245-B58E-FB4A6EE43231}" type="slidenum">
               <a:rPr kumimoji="1" lang="ja-JP" altLang="en-US" smtClean="0"/>
+              <a:pPr/>
               <a:t>&lt;#&gt;</a:t>
             </a:fld>
             <a:endParaRPr kumimoji="1" lang="ja-JP" altLang="en-US"/>
@@ -485,7 +487,8 @@
           <a:p>
             <a:fld id="{B7AD0B82-7909-4859-B207-4CBCE1B1F787}" type="datetimeFigureOut">
               <a:rPr kumimoji="1" lang="ja-JP" altLang="en-US" smtClean="0"/>
-              <a:t>2013/5/23</a:t>
+              <a:pPr/>
+              <a:t>2013/6/19</a:t>
             </a:fld>
             <a:endParaRPr kumimoji="1" lang="ja-JP" altLang="en-US"/>
           </a:p>
@@ -527,6 +530,7 @@
           <a:p>
             <a:fld id="{925F48D1-CF89-4245-B58E-FB4A6EE43231}" type="slidenum">
               <a:rPr kumimoji="1" lang="ja-JP" altLang="en-US" smtClean="0"/>
+              <a:pPr/>
               <a:t>&lt;#&gt;</a:t>
             </a:fld>
             <a:endParaRPr kumimoji="1" lang="ja-JP" altLang="en-US"/>
@@ -692,7 +696,8 @@
           <a:p>
             <a:fld id="{B7AD0B82-7909-4859-B207-4CBCE1B1F787}" type="datetimeFigureOut">
               <a:rPr kumimoji="1" lang="ja-JP" altLang="en-US" smtClean="0"/>
-              <a:t>2013/5/23</a:t>
+              <a:pPr/>
+              <a:t>2013/6/19</a:t>
             </a:fld>
             <a:endParaRPr kumimoji="1" lang="ja-JP" altLang="en-US"/>
           </a:p>
@@ -734,6 +739,7 @@
           <a:p>
             <a:fld id="{925F48D1-CF89-4245-B58E-FB4A6EE43231}" type="slidenum">
               <a:rPr kumimoji="1" lang="ja-JP" altLang="en-US" smtClean="0"/>
+              <a:pPr/>
               <a:t>&lt;#&gt;</a:t>
             </a:fld>
             <a:endParaRPr kumimoji="1" lang="ja-JP" altLang="en-US"/>
@@ -889,7 +895,8 @@
           <a:p>
             <a:fld id="{B7AD0B82-7909-4859-B207-4CBCE1B1F787}" type="datetimeFigureOut">
               <a:rPr kumimoji="1" lang="ja-JP" altLang="en-US" smtClean="0"/>
-              <a:t>2013/5/23</a:t>
+              <a:pPr/>
+              <a:t>2013/6/19</a:t>
             </a:fld>
             <a:endParaRPr kumimoji="1" lang="ja-JP" altLang="en-US"/>
           </a:p>
@@ -931,6 +938,7 @@
           <a:p>
             <a:fld id="{925F48D1-CF89-4245-B58E-FB4A6EE43231}" type="slidenum">
               <a:rPr kumimoji="1" lang="ja-JP" altLang="en-US" smtClean="0"/>
+              <a:pPr/>
               <a:t>&lt;#&gt;</a:t>
             </a:fld>
             <a:endParaRPr kumimoji="1" lang="ja-JP" altLang="en-US"/>
@@ -1130,7 +1138,8 @@
           <a:p>
             <a:fld id="{B7AD0B82-7909-4859-B207-4CBCE1B1F787}" type="datetimeFigureOut">
               <a:rPr kumimoji="1" lang="ja-JP" altLang="en-US" smtClean="0"/>
-              <a:t>2013/5/23</a:t>
+              <a:pPr/>
+              <a:t>2013/6/19</a:t>
             </a:fld>
             <a:endParaRPr kumimoji="1" lang="ja-JP" altLang="en-US"/>
           </a:p>
@@ -1172,6 +1181,7 @@
           <a:p>
             <a:fld id="{925F48D1-CF89-4245-B58E-FB4A6EE43231}" type="slidenum">
               <a:rPr kumimoji="1" lang="ja-JP" altLang="en-US" smtClean="0"/>
+              <a:pPr/>
               <a:t>&lt;#&gt;</a:t>
             </a:fld>
             <a:endParaRPr kumimoji="1" lang="ja-JP" altLang="en-US"/>
@@ -1477,7 +1487,8 @@
           <a:p>
             <a:fld id="{B7AD0B82-7909-4859-B207-4CBCE1B1F787}" type="datetimeFigureOut">
               <a:rPr kumimoji="1" lang="ja-JP" altLang="en-US" smtClean="0"/>
-              <a:t>2013/5/23</a:t>
+              <a:pPr/>
+              <a:t>2013/6/19</a:t>
             </a:fld>
             <a:endParaRPr kumimoji="1" lang="ja-JP" altLang="en-US"/>
           </a:p>
@@ -1519,6 +1530,7 @@
           <a:p>
             <a:fld id="{925F48D1-CF89-4245-B58E-FB4A6EE43231}" type="slidenum">
               <a:rPr kumimoji="1" lang="ja-JP" altLang="en-US" smtClean="0"/>
+              <a:pPr/>
               <a:t>&lt;#&gt;</a:t>
             </a:fld>
             <a:endParaRPr kumimoji="1" lang="ja-JP" altLang="en-US"/>
@@ -1963,7 +1975,8 @@
           <a:p>
             <a:fld id="{B7AD0B82-7909-4859-B207-4CBCE1B1F787}" type="datetimeFigureOut">
               <a:rPr kumimoji="1" lang="ja-JP" altLang="en-US" smtClean="0"/>
-              <a:t>2013/5/23</a:t>
+              <a:pPr/>
+              <a:t>2013/6/19</a:t>
             </a:fld>
             <a:endParaRPr kumimoji="1" lang="ja-JP" altLang="en-US"/>
           </a:p>
@@ -2005,6 +2018,7 @@
           <a:p>
             <a:fld id="{925F48D1-CF89-4245-B58E-FB4A6EE43231}" type="slidenum">
               <a:rPr kumimoji="1" lang="ja-JP" altLang="en-US" smtClean="0"/>
+              <a:pPr/>
               <a:t>&lt;#&gt;</a:t>
             </a:fld>
             <a:endParaRPr kumimoji="1" lang="ja-JP" altLang="en-US"/>
@@ -2076,7 +2090,8 @@
           <a:p>
             <a:fld id="{B7AD0B82-7909-4859-B207-4CBCE1B1F787}" type="datetimeFigureOut">
               <a:rPr kumimoji="1" lang="ja-JP" altLang="en-US" smtClean="0"/>
-              <a:t>2013/5/23</a:t>
+              <a:pPr/>
+              <a:t>2013/6/19</a:t>
             </a:fld>
             <a:endParaRPr kumimoji="1" lang="ja-JP" altLang="en-US"/>
           </a:p>
@@ -2118,6 +2133,7 @@
           <a:p>
             <a:fld id="{925F48D1-CF89-4245-B58E-FB4A6EE43231}" type="slidenum">
               <a:rPr kumimoji="1" lang="ja-JP" altLang="en-US" smtClean="0"/>
+              <a:pPr/>
               <a:t>&lt;#&gt;</a:t>
             </a:fld>
             <a:endParaRPr kumimoji="1" lang="ja-JP" altLang="en-US"/>
@@ -2166,7 +2182,8 @@
           <a:p>
             <a:fld id="{B7AD0B82-7909-4859-B207-4CBCE1B1F787}" type="datetimeFigureOut">
               <a:rPr kumimoji="1" lang="ja-JP" altLang="en-US" smtClean="0"/>
-              <a:t>2013/5/23</a:t>
+              <a:pPr/>
+              <a:t>2013/6/19</a:t>
             </a:fld>
             <a:endParaRPr kumimoji="1" lang="ja-JP" altLang="en-US"/>
           </a:p>
@@ -2208,6 +2225,7 @@
           <a:p>
             <a:fld id="{925F48D1-CF89-4245-B58E-FB4A6EE43231}" type="slidenum">
               <a:rPr kumimoji="1" lang="ja-JP" altLang="en-US" smtClean="0"/>
+              <a:pPr/>
               <a:t>&lt;#&gt;</a:t>
             </a:fld>
             <a:endParaRPr kumimoji="1" lang="ja-JP" altLang="en-US"/>
@@ -2470,7 +2488,8 @@
           <a:p>
             <a:fld id="{B7AD0B82-7909-4859-B207-4CBCE1B1F787}" type="datetimeFigureOut">
               <a:rPr kumimoji="1" lang="ja-JP" altLang="en-US" smtClean="0"/>
-              <a:t>2013/5/23</a:t>
+              <a:pPr/>
+              <a:t>2013/6/19</a:t>
             </a:fld>
             <a:endParaRPr kumimoji="1" lang="ja-JP" altLang="en-US"/>
           </a:p>
@@ -2512,6 +2531,7 @@
           <a:p>
             <a:fld id="{925F48D1-CF89-4245-B58E-FB4A6EE43231}" type="slidenum">
               <a:rPr kumimoji="1" lang="ja-JP" altLang="en-US" smtClean="0"/>
+              <a:pPr/>
               <a:t>&lt;#&gt;</a:t>
             </a:fld>
             <a:endParaRPr kumimoji="1" lang="ja-JP" altLang="en-US"/>
@@ -2718,7 +2738,8 @@
           <a:p>
             <a:fld id="{B7AD0B82-7909-4859-B207-4CBCE1B1F787}" type="datetimeFigureOut">
               <a:rPr kumimoji="1" lang="ja-JP" altLang="en-US" smtClean="0"/>
-              <a:t>2013/5/23</a:t>
+              <a:pPr/>
+              <a:t>2013/6/19</a:t>
             </a:fld>
             <a:endParaRPr kumimoji="1" lang="ja-JP" altLang="en-US"/>
           </a:p>
@@ -2760,6 +2781,7 @@
           <a:p>
             <a:fld id="{925F48D1-CF89-4245-B58E-FB4A6EE43231}" type="slidenum">
               <a:rPr kumimoji="1" lang="ja-JP" altLang="en-US" smtClean="0"/>
+              <a:pPr/>
               <a:t>&lt;#&gt;</a:t>
             </a:fld>
             <a:endParaRPr kumimoji="1" lang="ja-JP" altLang="en-US"/>
@@ -2958,7 +2980,8 @@
           <a:p>
             <a:fld id="{B7AD0B82-7909-4859-B207-4CBCE1B1F787}" type="datetimeFigureOut">
               <a:rPr kumimoji="1" lang="ja-JP" altLang="en-US" smtClean="0"/>
-              <a:t>2013/5/23</a:t>
+              <a:pPr/>
+              <a:t>2013/6/19</a:t>
             </a:fld>
             <a:endParaRPr kumimoji="1" lang="ja-JP" altLang="en-US"/>
           </a:p>
@@ -3036,6 +3059,7 @@
           <a:p>
             <a:fld id="{925F48D1-CF89-4245-B58E-FB4A6EE43231}" type="slidenum">
               <a:rPr kumimoji="1" lang="ja-JP" altLang="en-US" smtClean="0"/>
+              <a:pPr/>
               <a:t>&lt;#&gt;</a:t>
             </a:fld>
             <a:endParaRPr kumimoji="1" lang="ja-JP" altLang="en-US"/>
@@ -3980,11 +4004,6 @@
               </a:rPr>
               <a:t>を経由して、極めて効率的に行うことができます。</a:t>
             </a:r>
-            <a:endParaRPr lang="ja-JP" altLang="ja-JP" sz="1200" dirty="0">
-              <a:latin typeface="メイリオ" pitchFamily="50"/>
-              <a:ea typeface="メイリオ" pitchFamily="50"/>
-              <a:cs typeface="ＭＳ Ｐゴシック" pitchFamily="50"/>
-            </a:endParaRPr>
           </a:p>
         </p:txBody>
       </p:sp>
@@ -4184,14 +4203,6 @@
               </a:rPr>
               <a:t>の活用事例</a:t>
             </a:r>
-            <a:endParaRPr lang="ja-JP" altLang="ja-JP" sz="1400" b="1" dirty="0">
-              <a:solidFill>
-                <a:schemeClr val="bg1"/>
-              </a:solidFill>
-              <a:latin typeface="メイリオ" pitchFamily="50"/>
-              <a:ea typeface="メイリオ" pitchFamily="50"/>
-              <a:cs typeface="ＭＳ Ｐゴシック" pitchFamily="50"/>
-            </a:endParaRPr>
           </a:p>
         </p:txBody>
       </p:sp>
@@ -4354,11 +4365,6 @@
               </a:rPr>
               <a:t>大量のコンピューティングリソースを提供する基盤として</a:t>
             </a:r>
-            <a:endParaRPr lang="ja-JP" altLang="ja-JP" sz="1000" dirty="0">
-              <a:latin typeface="メイリオ" pitchFamily="50"/>
-              <a:ea typeface="メイリオ" pitchFamily="50"/>
-              <a:cs typeface="ＭＳ Ｐゴシック" pitchFamily="50"/>
-            </a:endParaRPr>
           </a:p>
         </p:txBody>
       </p:sp>
@@ -4843,11 +4849,6 @@
               </a:rPr>
               <a:t>パブリッククラウドとの互換性は、セキュリティポリシーや経済性等のビジネスの要求条件による、プライベートクラウドからのデータとアプリケーションの容易な移行を可能にします。</a:t>
             </a:r>
-            <a:endParaRPr lang="ja-JP" altLang="ja-JP" sz="1200" dirty="0">
-              <a:latin typeface="メイリオ" pitchFamily="50"/>
-              <a:ea typeface="メイリオ" pitchFamily="50"/>
-              <a:cs typeface="ＭＳ Ｐゴシック" pitchFamily="50"/>
-            </a:endParaRPr>
           </a:p>
         </p:txBody>
       </p:sp>
@@ -4892,7 +4893,7 @@
         <p:spPr>
           <a:xfrm>
             <a:off x="3987333" y="2412182"/>
-            <a:ext cx="3380176" cy="6801862"/>
+            <a:ext cx="3380176" cy="7355860"/>
           </a:xfrm>
           <a:prstGeom prst="rect">
             <a:avLst/>
@@ -5541,8 +5542,21 @@
                 <a:ea typeface="メイリオ" pitchFamily="2"/>
                 <a:cs typeface="ＭＳ Ｐゴシック" pitchFamily="50"/>
               </a:rPr>
-              <a:t>上のサービスへディプロイする仕組みを提供する。</a:t>
-            </a:r>
+              <a:t>上のサービスへディプロイする仕組みを提供する</a:t>
+            </a:r>
+            <a:r>
+              <a:rPr lang="ja-JP" altLang="ja-JP" sz="1200" dirty="0" smtClean="0">
+                <a:latin typeface="メイリオ" pitchFamily="18"/>
+                <a:ea typeface="メイリオ" pitchFamily="2"/>
+                <a:cs typeface="ＭＳ Ｐゴシック" pitchFamily="50"/>
+              </a:rPr>
+              <a:t>。</a:t>
+            </a:r>
+            <a:endParaRPr lang="en-US" altLang="ja-JP" sz="1200" dirty="0" smtClean="0">
+              <a:latin typeface="メイリオ" pitchFamily="18"/>
+              <a:ea typeface="メイリオ" pitchFamily="2"/>
+              <a:cs typeface="ＭＳ Ｐゴシック" pitchFamily="50"/>
+            </a:endParaRPr>
           </a:p>
           <a:p>
             <a:pPr lvl="0" hangingPunct="0">
@@ -5552,7 +5566,7 @@
               </a:defRPr>
             </a:pPr>
             <a:r>
-              <a:rPr lang="ja-JP" altLang="ja-JP" sz="1200" dirty="0">
+              <a:rPr lang="ja-JP" altLang="en-US" sz="1200" dirty="0" smtClean="0">
                 <a:latin typeface="メイリオ" pitchFamily="18"/>
                 <a:ea typeface="メイリオ" pitchFamily="2"/>
                 <a:cs typeface="ＭＳ Ｐゴシック" pitchFamily="50"/>
@@ -5560,15 +5574,68 @@
               <a:t>■</a:t>
             </a:r>
             <a:r>
-              <a:rPr lang="en-US" altLang="ja-JP" sz="1200" b="1" dirty="0">
-                <a:latin typeface="メイリオ" pitchFamily="18"/>
-                <a:ea typeface="メイリオ" pitchFamily="2"/>
-                <a:cs typeface="ＭＳ Ｐゴシック" pitchFamily="50"/>
-              </a:rPr>
-              <a:t>Savanna</a:t>
-            </a:r>
-            <a:r>
-              <a:rPr lang="ja-JP" altLang="en-US" sz="1200" b="1" dirty="0">
+              <a:rPr lang="en-US" altLang="ja-JP" sz="1200" b="1" dirty="0" smtClean="0">
+                <a:latin typeface="メイリオ" pitchFamily="18"/>
+                <a:ea typeface="メイリオ" pitchFamily="2"/>
+                <a:cs typeface="ＭＳ Ｐゴシック" pitchFamily="50"/>
+              </a:rPr>
+              <a:t>Ironic</a:t>
+            </a:r>
+            <a:r>
+              <a:rPr lang="ja-JP" altLang="en-US" sz="1200" dirty="0" smtClean="0">
+                <a:latin typeface="メイリオ" pitchFamily="18"/>
+                <a:ea typeface="メイリオ" pitchFamily="2"/>
+                <a:cs typeface="ＭＳ Ｐゴシック" pitchFamily="50"/>
+              </a:rPr>
+              <a:t> ベアメタル環境のディプロイを行う。</a:t>
+            </a:r>
+            <a:r>
+              <a:rPr lang="en-US" altLang="ja-JP" sz="1200" dirty="0" smtClean="0">
+                <a:latin typeface="メイリオ" pitchFamily="18"/>
+                <a:ea typeface="メイリオ" pitchFamily="2"/>
+                <a:cs typeface="ＭＳ Ｐゴシック" pitchFamily="50"/>
+              </a:rPr>
+              <a:t>Nova</a:t>
+            </a:r>
+            <a:r>
+              <a:rPr lang="ja-JP" altLang="en-US" sz="1200" dirty="0" smtClean="0">
+                <a:latin typeface="メイリオ" pitchFamily="18"/>
+                <a:ea typeface="メイリオ" pitchFamily="2"/>
+                <a:cs typeface="ＭＳ Ｐゴシック" pitchFamily="50"/>
+              </a:rPr>
+              <a:t>からの機能分離。</a:t>
+            </a:r>
+            <a:endParaRPr lang="en-US" altLang="ja-JP" sz="1200" dirty="0" smtClean="0">
+              <a:latin typeface="メイリオ" pitchFamily="18"/>
+              <a:ea typeface="メイリオ" pitchFamily="2"/>
+              <a:cs typeface="ＭＳ Ｐゴシック" pitchFamily="50"/>
+            </a:endParaRPr>
+          </a:p>
+          <a:p>
+            <a:pPr lvl="0" hangingPunct="0">
+              <a:defRPr>
+                <a:latin typeface="メイリオ" pitchFamily="2"/>
+                <a:ea typeface="メイリオ" pitchFamily="2"/>
+              </a:defRPr>
+            </a:pPr>
+            <a:r>
+              <a:rPr lang="ja-JP" altLang="en-US" sz="1200" dirty="0" smtClean="0">
+                <a:latin typeface="メイリオ" pitchFamily="18"/>
+                <a:ea typeface="メイリオ" pitchFamily="2"/>
+                <a:cs typeface="ＭＳ Ｐゴシック" pitchFamily="50"/>
+              </a:rPr>
+              <a:t>■</a:t>
+            </a:r>
+            <a:r>
+              <a:rPr lang="en-US" altLang="ja-JP" sz="1200" b="1" dirty="0" err="1" smtClean="0">
+                <a:latin typeface="メイリオ" pitchFamily="18"/>
+                <a:ea typeface="メイリオ" pitchFamily="2"/>
+                <a:cs typeface="ＭＳ Ｐゴシック" pitchFamily="50"/>
+              </a:rPr>
+              <a:t>RedDwarf</a:t>
+            </a:r>
+            <a:r>
+              <a:rPr lang="ja-JP" altLang="en-US" sz="1200" dirty="0" smtClean="0">
                 <a:latin typeface="メイリオ" pitchFamily="18"/>
                 <a:ea typeface="メイリオ" pitchFamily="2"/>
                 <a:cs typeface="ＭＳ Ｐゴシック" pitchFamily="50"/>
@@ -5576,36 +5643,20 @@
               <a:t> </a:t>
             </a:r>
             <a:r>
-              <a:rPr lang="en-US" altLang="ja-JP" sz="1200" dirty="0" err="1">
-                <a:latin typeface="メイリオ" pitchFamily="18"/>
-                <a:ea typeface="メイリオ" pitchFamily="2"/>
-                <a:cs typeface="ＭＳ Ｐゴシック" pitchFamily="50"/>
-              </a:rPr>
-              <a:t>OpenStack</a:t>
-            </a:r>
-            <a:r>
-              <a:rPr lang="ja-JP" altLang="en-US" sz="1200" dirty="0">
-                <a:latin typeface="メイリオ" pitchFamily="18"/>
-                <a:ea typeface="メイリオ" pitchFamily="2"/>
-                <a:cs typeface="ＭＳ Ｐゴシック" pitchFamily="50"/>
-              </a:rPr>
-              <a:t>上に</a:t>
-            </a:r>
-            <a:r>
-              <a:rPr lang="en-US" altLang="ja-JP" sz="1200" dirty="0" err="1">
-                <a:latin typeface="メイリオ" pitchFamily="18"/>
-                <a:ea typeface="メイリオ" pitchFamily="2"/>
-                <a:cs typeface="ＭＳ Ｐゴシック" pitchFamily="50"/>
-              </a:rPr>
-              <a:t>Hadoop</a:t>
-            </a:r>
-            <a:r>
-              <a:rPr lang="ja-JP" altLang="en-US" sz="1200" dirty="0">
-                <a:latin typeface="メイリオ" pitchFamily="18"/>
-                <a:ea typeface="メイリオ" pitchFamily="2"/>
-                <a:cs typeface="ＭＳ Ｐゴシック" pitchFamily="50"/>
-              </a:rPr>
-              <a:t>クラスタを迅速にディプロイメントする仕組みを提供します。</a:t>
+              <a:rPr lang="en-US" altLang="ja-JP" sz="1200" dirty="0" err="1" smtClean="0">
+                <a:latin typeface="メイリオ" pitchFamily="18"/>
+                <a:ea typeface="メイリオ" pitchFamily="2"/>
+                <a:cs typeface="ＭＳ Ｐゴシック" pitchFamily="50"/>
+              </a:rPr>
+              <a:t>DBaaS</a:t>
+            </a:r>
+            <a:r>
+              <a:rPr lang="ja-JP" altLang="en-US" sz="1200" dirty="0" smtClean="0">
+                <a:latin typeface="メイリオ" pitchFamily="18"/>
+                <a:ea typeface="メイリオ" pitchFamily="2"/>
+                <a:cs typeface="ＭＳ Ｐゴシック" pitchFamily="50"/>
+              </a:rPr>
+              <a:t>を実現する仕組み。</a:t>
             </a:r>
             <a:endParaRPr lang="ja-JP" altLang="ja-JP" sz="1200" dirty="0">
               <a:latin typeface="メイリオ" pitchFamily="18"/>
@@ -5613,6 +5664,75 @@
               <a:cs typeface="ＭＳ Ｐゴシック" pitchFamily="50"/>
             </a:endParaRPr>
           </a:p>
+          <a:p>
+            <a:pPr lvl="0" hangingPunct="0">
+              <a:defRPr>
+                <a:latin typeface="メイリオ" pitchFamily="2"/>
+                <a:ea typeface="メイリオ" pitchFamily="2"/>
+              </a:defRPr>
+            </a:pPr>
+            <a:r>
+              <a:rPr lang="ja-JP" altLang="ja-JP" sz="1200" dirty="0">
+                <a:latin typeface="メイリオ" pitchFamily="18"/>
+                <a:ea typeface="メイリオ" pitchFamily="2"/>
+                <a:cs typeface="ＭＳ Ｐゴシック" pitchFamily="50"/>
+              </a:rPr>
+              <a:t>■</a:t>
+            </a:r>
+            <a:r>
+              <a:rPr lang="en-US" altLang="ja-JP" sz="1200" b="1" dirty="0">
+                <a:latin typeface="メイリオ" pitchFamily="18"/>
+                <a:ea typeface="メイリオ" pitchFamily="2"/>
+                <a:cs typeface="ＭＳ Ｐゴシック" pitchFamily="50"/>
+              </a:rPr>
+              <a:t>Savanna</a:t>
+            </a:r>
+            <a:r>
+              <a:rPr lang="ja-JP" altLang="en-US" sz="1200" b="1" dirty="0">
+                <a:latin typeface="メイリオ" pitchFamily="18"/>
+                <a:ea typeface="メイリオ" pitchFamily="2"/>
+                <a:cs typeface="ＭＳ Ｐゴシック" pitchFamily="50"/>
+              </a:rPr>
+              <a:t> </a:t>
+            </a:r>
+            <a:r>
+              <a:rPr lang="en-US" altLang="ja-JP" sz="1200" dirty="0" err="1">
+                <a:latin typeface="メイリオ" pitchFamily="18"/>
+                <a:ea typeface="メイリオ" pitchFamily="2"/>
+                <a:cs typeface="ＭＳ Ｐゴシック" pitchFamily="50"/>
+              </a:rPr>
+              <a:t>OpenStack</a:t>
+            </a:r>
+            <a:r>
+              <a:rPr lang="ja-JP" altLang="en-US" sz="1200" dirty="0">
+                <a:latin typeface="メイリオ" pitchFamily="18"/>
+                <a:ea typeface="メイリオ" pitchFamily="2"/>
+                <a:cs typeface="ＭＳ Ｐゴシック" pitchFamily="50"/>
+              </a:rPr>
+              <a:t>上に</a:t>
+            </a:r>
+            <a:r>
+              <a:rPr lang="en-US" altLang="ja-JP" sz="1200" dirty="0" err="1">
+                <a:latin typeface="メイリオ" pitchFamily="18"/>
+                <a:ea typeface="メイリオ" pitchFamily="2"/>
+                <a:cs typeface="ＭＳ Ｐゴシック" pitchFamily="50"/>
+              </a:rPr>
+              <a:t>Hadoop</a:t>
+            </a:r>
+            <a:r>
+              <a:rPr lang="ja-JP" altLang="en-US" sz="1200" dirty="0">
+                <a:latin typeface="メイリオ" pitchFamily="18"/>
+                <a:ea typeface="メイリオ" pitchFamily="2"/>
+                <a:cs typeface="ＭＳ Ｐゴシック" pitchFamily="50"/>
+              </a:rPr>
+              <a:t>クラスタを迅速にディプロイメントする仕組みを提供します。</a:t>
+            </a:r>
+            <a:endParaRPr lang="ja-JP" altLang="ja-JP" sz="1200" dirty="0">
+              <a:latin typeface="メイリオ" pitchFamily="18"/>
+              <a:ea typeface="メイリオ" pitchFamily="2"/>
+              <a:cs typeface="ＭＳ Ｐゴシック" pitchFamily="50"/>
+            </a:endParaRPr>
+          </a:p>
         </p:txBody>
       </p:sp>
       <p:sp>
@@ -5623,7 +5743,7 @@
         </p:nvSpPr>
         <p:spPr>
           <a:xfrm>
-            <a:off x="5627443" y="40531"/>
+            <a:off x="5469358" y="40531"/>
             <a:ext cx="1677170" cy="533860"/>
           </a:xfrm>
           <a:custGeom>
@@ -6009,11 +6129,6 @@
               </a:rPr>
               <a:t>はオープンソースのプライベート／パブリッククラウド構築基盤ソフトウェアであり、複数のコンポーネントから構成されます。利用者はこれらのコンポーネントを組み合わせてオリジナルのサービス環境を構築することができます。</a:t>
             </a:r>
-            <a:endParaRPr lang="ja-JP" altLang="ja-JP" sz="1400" dirty="0">
-              <a:latin typeface="メイリオ" pitchFamily="18"/>
-              <a:ea typeface="メイリオ" pitchFamily="2"/>
-              <a:cs typeface="ＭＳ Ｐゴシック" pitchFamily="50"/>
-            </a:endParaRPr>
           </a:p>
         </p:txBody>
       </p:sp>

</xml_diff>